<commit_message>
comments to Aaron, thank you for help :-)
</commit_message>
<xml_diff>
--- a/plugins/vdm2isa/pub/isq-lib/International System of Quantities library in VDM.pptx
+++ b/plugins/vdm2isa/pub/isq-lib/International System of Quantities library in VDM.pptx
@@ -1799,10 +1799,10 @@
         <a:lstStyle/>
         <a:p>
           <a:r>
-            <a:rPr lang="en-GB"/>
+            <a:rPr lang="en-GB" dirty="0"/>
             <a:t>Reduced error-prone and tedious calculations</a:t>
           </a:r>
-          <a:endParaRPr lang="en-US"/>
+          <a:endParaRPr lang="en-US" dirty="0"/>
         </a:p>
       </dgm:t>
     </dgm:pt>
@@ -1828,6 +1828,42 @@
         </a:p>
       </dgm:t>
     </dgm:pt>
+    <dgm:pt modelId="{CC2BD797-68E3-B14D-A58C-5AE3613F65CC}">
+      <dgm:prSet/>
+      <dgm:spPr/>
+      <dgm:t>
+        <a:bodyPr/>
+        <a:lstStyle/>
+        <a:p>
+          <a:r>
+            <a:rPr lang="en-GB" dirty="0"/>
+            <a:t>History: used for personalised medicine application conversions</a:t>
+          </a:r>
+        </a:p>
+      </dgm:t>
+    </dgm:pt>
+    <dgm:pt modelId="{5CDD28F9-25EE-124B-AFA0-C5905EDF8CEF}" type="parTrans" cxnId="{6B2E8E09-9AD8-D442-8B85-D7BA9D32D4F6}">
+      <dgm:prSet/>
+      <dgm:spPr/>
+      <dgm:t>
+        <a:bodyPr/>
+        <a:lstStyle/>
+        <a:p>
+          <a:endParaRPr lang="en-GB"/>
+        </a:p>
+      </dgm:t>
+    </dgm:pt>
+    <dgm:pt modelId="{A2B252F8-B55B-5948-AC43-609771D5879B}" type="sibTrans" cxnId="{6B2E8E09-9AD8-D442-8B85-D7BA9D32D4F6}">
+      <dgm:prSet/>
+      <dgm:spPr/>
+      <dgm:t>
+        <a:bodyPr/>
+        <a:lstStyle/>
+        <a:p>
+          <a:endParaRPr lang="en-GB"/>
+        </a:p>
+      </dgm:t>
+    </dgm:pt>
     <dgm:pt modelId="{813FDE9A-E8E7-4061-94D9-36B22F7C9C32}" type="pres">
       <dgm:prSet presAssocID="{2460A5CF-1015-4DE8-AABB-8F9532BDCF1B}" presName="linear" presStyleCnt="0">
         <dgm:presLayoutVars>
@@ -1838,7 +1874,7 @@
       <dgm:spPr/>
     </dgm:pt>
     <dgm:pt modelId="{04301A2A-3FF8-42FE-91C0-2372258EEF9D}" type="pres">
-      <dgm:prSet presAssocID="{6DC7BF1F-59DB-4714-9EC4-9A1C4943C7A0}" presName="parentText" presStyleLbl="node1" presStyleIdx="0" presStyleCnt="5">
+      <dgm:prSet presAssocID="{6DC7BF1F-59DB-4714-9EC4-9A1C4943C7A0}" presName="parentText" presStyleLbl="node1" presStyleIdx="0" presStyleCnt="6">
         <dgm:presLayoutVars>
           <dgm:chMax val="0"/>
           <dgm:bulletEnabled val="1"/>
@@ -1851,7 +1887,7 @@
       <dgm:spPr/>
     </dgm:pt>
     <dgm:pt modelId="{B18C51FE-E40F-4D41-B6F4-70B50768656F}" type="pres">
-      <dgm:prSet presAssocID="{3925E2C9-158B-43BA-B6A6-E25B63E69F13}" presName="parentText" presStyleLbl="node1" presStyleIdx="1" presStyleCnt="5">
+      <dgm:prSet presAssocID="{3925E2C9-158B-43BA-B6A6-E25B63E69F13}" presName="parentText" presStyleLbl="node1" presStyleIdx="1" presStyleCnt="6">
         <dgm:presLayoutVars>
           <dgm:chMax val="0"/>
           <dgm:bulletEnabled val="1"/>
@@ -1864,7 +1900,7 @@
       <dgm:spPr/>
     </dgm:pt>
     <dgm:pt modelId="{58D27147-9A34-4C24-9712-E2D75045564E}" type="pres">
-      <dgm:prSet presAssocID="{F57C2B72-4538-4B29-9926-0E574608E4DD}" presName="parentText" presStyleLbl="node1" presStyleIdx="2" presStyleCnt="5">
+      <dgm:prSet presAssocID="{F57C2B72-4538-4B29-9926-0E574608E4DD}" presName="parentText" presStyleLbl="node1" presStyleIdx="2" presStyleCnt="6">
         <dgm:presLayoutVars>
           <dgm:chMax val="0"/>
           <dgm:bulletEnabled val="1"/>
@@ -1877,7 +1913,7 @@
       <dgm:spPr/>
     </dgm:pt>
     <dgm:pt modelId="{808B7242-BF56-480B-AAC4-CEB7E754ADBE}" type="pres">
-      <dgm:prSet presAssocID="{410730B5-B62C-4988-8706-F3AD9711E93A}" presName="parentText" presStyleLbl="node1" presStyleIdx="3" presStyleCnt="5">
+      <dgm:prSet presAssocID="{410730B5-B62C-4988-8706-F3AD9711E93A}" presName="parentText" presStyleLbl="node1" presStyleIdx="3" presStyleCnt="6">
         <dgm:presLayoutVars>
           <dgm:chMax val="0"/>
           <dgm:bulletEnabled val="1"/>
@@ -1890,7 +1926,20 @@
       <dgm:spPr/>
     </dgm:pt>
     <dgm:pt modelId="{E80F8E7D-49DF-418B-B160-6F7C5CEA2B32}" type="pres">
-      <dgm:prSet presAssocID="{37C3FD78-32F3-41A3-870C-C0249B88864A}" presName="parentText" presStyleLbl="node1" presStyleIdx="4" presStyleCnt="5">
+      <dgm:prSet presAssocID="{37C3FD78-32F3-41A3-870C-C0249B88864A}" presName="parentText" presStyleLbl="node1" presStyleIdx="4" presStyleCnt="6">
+        <dgm:presLayoutVars>
+          <dgm:chMax val="0"/>
+          <dgm:bulletEnabled val="1"/>
+        </dgm:presLayoutVars>
+      </dgm:prSet>
+      <dgm:spPr/>
+    </dgm:pt>
+    <dgm:pt modelId="{02A995C3-F8DC-FA49-BB95-CCA0FB46D820}" type="pres">
+      <dgm:prSet presAssocID="{39E6F3A0-BF01-4459-B99F-6437C1AE9108}" presName="spacer" presStyleCnt="0"/>
+      <dgm:spPr/>
+    </dgm:pt>
+    <dgm:pt modelId="{05612A00-4CA2-894F-B3D1-CE9AA7B5D3C6}" type="pres">
+      <dgm:prSet presAssocID="{CC2BD797-68E3-B14D-A58C-5AE3613F65CC}" presName="parentText" presStyleLbl="node1" presStyleIdx="5" presStyleCnt="6">
         <dgm:presLayoutVars>
           <dgm:chMax val="0"/>
           <dgm:bulletEnabled val="1"/>
@@ -1901,10 +1950,12 @@
   </dgm:ptLst>
   <dgm:cxnLst>
     <dgm:cxn modelId="{D81CC108-6FA9-49F0-831B-41219295AF73}" srcId="{2460A5CF-1015-4DE8-AABB-8F9532BDCF1B}" destId="{3925E2C9-158B-43BA-B6A6-E25B63E69F13}" srcOrd="1" destOrd="0" parTransId="{B8A7E401-0253-4088-8483-F0D0381F714F}" sibTransId="{101AAE69-8670-454E-AA23-B3C7C2DFB6F2}"/>
+    <dgm:cxn modelId="{6B2E8E09-9AD8-D442-8B85-D7BA9D32D4F6}" srcId="{2460A5CF-1015-4DE8-AABB-8F9532BDCF1B}" destId="{CC2BD797-68E3-B14D-A58C-5AE3613F65CC}" srcOrd="5" destOrd="0" parTransId="{5CDD28F9-25EE-124B-AFA0-C5905EDF8CEF}" sibTransId="{A2B252F8-B55B-5948-AC43-609771D5879B}"/>
     <dgm:cxn modelId="{E9452019-45CB-4000-90EF-CECEB2308401}" srcId="{2460A5CF-1015-4DE8-AABB-8F9532BDCF1B}" destId="{410730B5-B62C-4988-8706-F3AD9711E93A}" srcOrd="3" destOrd="0" parTransId="{CBA9EB43-01BB-4DFC-B160-9B239D4A5A5A}" sibTransId="{F7F7CAC2-1EF7-49C9-B171-130C3C6D8C12}"/>
     <dgm:cxn modelId="{54E4211C-AF73-44D2-A443-CE44562B9450}" type="presOf" srcId="{37C3FD78-32F3-41A3-870C-C0249B88864A}" destId="{E80F8E7D-49DF-418B-B160-6F7C5CEA2B32}" srcOrd="0" destOrd="0" presId="urn:microsoft.com/office/officeart/2005/8/layout/vList2"/>
     <dgm:cxn modelId="{89718B22-1705-4CA3-BE40-93EF9115BE40}" srcId="{2460A5CF-1015-4DE8-AABB-8F9532BDCF1B}" destId="{6DC7BF1F-59DB-4714-9EC4-9A1C4943C7A0}" srcOrd="0" destOrd="0" parTransId="{B2E3A3C8-178F-4B33-898B-5E71D168DA69}" sibTransId="{6569ECEF-83F2-4323-9D6F-37E688A4C275}"/>
     <dgm:cxn modelId="{AB317C2D-D325-43FC-8E0E-78AAD6361783}" type="presOf" srcId="{6DC7BF1F-59DB-4714-9EC4-9A1C4943C7A0}" destId="{04301A2A-3FF8-42FE-91C0-2372258EEF9D}" srcOrd="0" destOrd="0" presId="urn:microsoft.com/office/officeart/2005/8/layout/vList2"/>
+    <dgm:cxn modelId="{1F530B62-224F-6549-915A-3B7177CB452B}" type="presOf" srcId="{CC2BD797-68E3-B14D-A58C-5AE3613F65CC}" destId="{05612A00-4CA2-894F-B3D1-CE9AA7B5D3C6}" srcOrd="0" destOrd="0" presId="urn:microsoft.com/office/officeart/2005/8/layout/vList2"/>
     <dgm:cxn modelId="{23B53571-0C77-4E05-A457-311931B2E567}" type="presOf" srcId="{3925E2C9-158B-43BA-B6A6-E25B63E69F13}" destId="{B18C51FE-E40F-4D41-B6F4-70B50768656F}" srcOrd="0" destOrd="0" presId="urn:microsoft.com/office/officeart/2005/8/layout/vList2"/>
     <dgm:cxn modelId="{F2051B8B-6FF6-43F2-A6DF-0D5DF326FE9B}" type="presOf" srcId="{F57C2B72-4538-4B29-9926-0E574608E4DD}" destId="{58D27147-9A34-4C24-9712-E2D75045564E}" srcOrd="0" destOrd="0" presId="urn:microsoft.com/office/officeart/2005/8/layout/vList2"/>
     <dgm:cxn modelId="{BE2D1CA4-33E7-4440-B15D-D81329258382}" type="presOf" srcId="{2460A5CF-1015-4DE8-AABB-8F9532BDCF1B}" destId="{813FDE9A-E8E7-4061-94D9-36B22F7C9C32}" srcOrd="0" destOrd="0" presId="urn:microsoft.com/office/officeart/2005/8/layout/vList2"/>
@@ -1920,6 +1971,8 @@
     <dgm:cxn modelId="{6FD7C46F-A99C-4C7C-BCC3-3984E9E91595}" type="presParOf" srcId="{813FDE9A-E8E7-4061-94D9-36B22F7C9C32}" destId="{808B7242-BF56-480B-AAC4-CEB7E754ADBE}" srcOrd="6" destOrd="0" presId="urn:microsoft.com/office/officeart/2005/8/layout/vList2"/>
     <dgm:cxn modelId="{96F385D7-5CD9-4B34-9720-1B7881D9AF74}" type="presParOf" srcId="{813FDE9A-E8E7-4061-94D9-36B22F7C9C32}" destId="{5DC46CB7-DE44-46E5-932F-AE33D4904A1A}" srcOrd="7" destOrd="0" presId="urn:microsoft.com/office/officeart/2005/8/layout/vList2"/>
     <dgm:cxn modelId="{E6E4C064-CA83-41DD-94F7-9D0BCF8D9CAC}" type="presParOf" srcId="{813FDE9A-E8E7-4061-94D9-36B22F7C9C32}" destId="{E80F8E7D-49DF-418B-B160-6F7C5CEA2B32}" srcOrd="8" destOrd="0" presId="urn:microsoft.com/office/officeart/2005/8/layout/vList2"/>
+    <dgm:cxn modelId="{B7300FC5-8368-F249-BB25-357C7B08B4A5}" type="presParOf" srcId="{813FDE9A-E8E7-4061-94D9-36B22F7C9C32}" destId="{02A995C3-F8DC-FA49-BB95-CCA0FB46D820}" srcOrd="9" destOrd="0" presId="urn:microsoft.com/office/officeart/2005/8/layout/vList2"/>
+    <dgm:cxn modelId="{E9240E68-25CF-F942-9D7D-321054FA06BE}" type="presParOf" srcId="{813FDE9A-E8E7-4061-94D9-36B22F7C9C32}" destId="{05612A00-4CA2-894F-B3D1-CE9AA7B5D3C6}" srcOrd="10" destOrd="0" presId="urn:microsoft.com/office/officeart/2005/8/layout/vList2"/>
   </dgm:cxnLst>
   <dgm:bg/>
   <dgm:whole/>
@@ -2187,8 +2240,8 @@
       </dsp:nvSpPr>
       <dsp:spPr>
         <a:xfrm>
-          <a:off x="0" y="335439"/>
-          <a:ext cx="8074794" cy="671580"/>
+          <a:off x="0" y="355103"/>
+          <a:ext cx="8074794" cy="551655"/>
         </a:xfrm>
         <a:prstGeom prst="roundRect">
           <a:avLst/>
@@ -2230,12 +2283,12 @@
         </a:fontRef>
       </dsp:style>
       <dsp:txBody>
-        <a:bodyPr spcFirstLastPara="0" vert="horz" wrap="square" lIns="106680" tIns="106680" rIns="106680" bIns="106680" numCol="1" spcCol="1270" anchor="ctr" anchorCtr="0">
+        <a:bodyPr spcFirstLastPara="0" vert="horz" wrap="square" lIns="87630" tIns="87630" rIns="87630" bIns="87630" numCol="1" spcCol="1270" anchor="ctr" anchorCtr="0">
           <a:noAutofit/>
         </a:bodyPr>
         <a:lstStyle/>
         <a:p>
-          <a:pPr marL="0" lvl="0" indent="0" algn="l" defTabSz="1244600">
+          <a:pPr marL="0" lvl="0" indent="0" algn="l" defTabSz="1022350">
             <a:lnSpc>
               <a:spcPct val="90000"/>
             </a:lnSpc>
@@ -2248,15 +2301,15 @@
             <a:buNone/>
           </a:pPr>
           <a:r>
-            <a:rPr lang="en-GB" sz="2800" kern="1200" dirty="0"/>
+            <a:rPr lang="en-GB" sz="2300" kern="1200" dirty="0"/>
             <a:t>Most used system of measurements</a:t>
           </a:r>
-          <a:endParaRPr lang="en-US" sz="2800" kern="1200" dirty="0"/>
+          <a:endParaRPr lang="en-US" sz="2300" kern="1200" dirty="0"/>
         </a:p>
       </dsp:txBody>
       <dsp:txXfrm>
-        <a:off x="32784" y="368223"/>
-        <a:ext cx="8009226" cy="606012"/>
+        <a:off x="26930" y="382033"/>
+        <a:ext cx="8020934" cy="497795"/>
       </dsp:txXfrm>
     </dsp:sp>
     <dsp:sp modelId="{B18C51FE-E40F-4D41-B6F4-70B50768656F}">
@@ -2266,8 +2319,8 @@
       </dsp:nvSpPr>
       <dsp:spPr>
         <a:xfrm>
-          <a:off x="0" y="1087659"/>
-          <a:ext cx="8074794" cy="671580"/>
+          <a:off x="0" y="972998"/>
+          <a:ext cx="8074794" cy="551655"/>
         </a:xfrm>
         <a:prstGeom prst="roundRect">
           <a:avLst/>
@@ -2309,12 +2362,12 @@
         </a:fontRef>
       </dsp:style>
       <dsp:txBody>
-        <a:bodyPr spcFirstLastPara="0" vert="horz" wrap="square" lIns="106680" tIns="106680" rIns="106680" bIns="106680" numCol="1" spcCol="1270" anchor="ctr" anchorCtr="0">
+        <a:bodyPr spcFirstLastPara="0" vert="horz" wrap="square" lIns="87630" tIns="87630" rIns="87630" bIns="87630" numCol="1" spcCol="1270" anchor="ctr" anchorCtr="0">
           <a:noAutofit/>
         </a:bodyPr>
         <a:lstStyle/>
         <a:p>
-          <a:pPr marL="0" lvl="0" indent="0" algn="l" defTabSz="1244600">
+          <a:pPr marL="0" lvl="0" indent="0" algn="l" defTabSz="1022350">
             <a:lnSpc>
               <a:spcPct val="90000"/>
             </a:lnSpc>
@@ -2327,15 +2380,15 @@
             <a:buNone/>
           </a:pPr>
           <a:r>
-            <a:rPr lang="en-GB" sz="2800" kern="1200"/>
+            <a:rPr lang="en-GB" sz="2300" kern="1200"/>
             <a:t>Elegant, minimal and coherent</a:t>
           </a:r>
-          <a:endParaRPr lang="en-US" sz="2800" kern="1200"/>
+          <a:endParaRPr lang="en-US" sz="2300" kern="1200"/>
         </a:p>
       </dsp:txBody>
       <dsp:txXfrm>
-        <a:off x="32784" y="1120443"/>
-        <a:ext cx="8009226" cy="606012"/>
+        <a:off x="26930" y="999928"/>
+        <a:ext cx="8020934" cy="497795"/>
       </dsp:txXfrm>
     </dsp:sp>
     <dsp:sp modelId="{58D27147-9A34-4C24-9712-E2D75045564E}">
@@ -2345,8 +2398,8 @@
       </dsp:nvSpPr>
       <dsp:spPr>
         <a:xfrm>
-          <a:off x="0" y="1839879"/>
-          <a:ext cx="8074794" cy="671580"/>
+          <a:off x="0" y="1590893"/>
+          <a:ext cx="8074794" cy="551655"/>
         </a:xfrm>
         <a:prstGeom prst="roundRect">
           <a:avLst/>
@@ -2388,12 +2441,12 @@
         </a:fontRef>
       </dsp:style>
       <dsp:txBody>
-        <a:bodyPr spcFirstLastPara="0" vert="horz" wrap="square" lIns="106680" tIns="106680" rIns="106680" bIns="106680" numCol="1" spcCol="1270" anchor="ctr" anchorCtr="0">
+        <a:bodyPr spcFirstLastPara="0" vert="horz" wrap="square" lIns="87630" tIns="87630" rIns="87630" bIns="87630" numCol="1" spcCol="1270" anchor="ctr" anchorCtr="0">
           <a:noAutofit/>
         </a:bodyPr>
         <a:lstStyle/>
         <a:p>
-          <a:pPr marL="0" lvl="0" indent="0" algn="l" defTabSz="1244600">
+          <a:pPr marL="0" lvl="0" indent="0" algn="l" defTabSz="1022350">
             <a:lnSpc>
               <a:spcPct val="90000"/>
             </a:lnSpc>
@@ -2406,15 +2459,15 @@
             <a:buNone/>
           </a:pPr>
           <a:r>
-            <a:rPr lang="en-GB" sz="2800" kern="1200"/>
+            <a:rPr lang="en-GB" sz="2300" kern="1200"/>
             <a:t>Seven base units, new units are coherent derivations</a:t>
           </a:r>
-          <a:endParaRPr lang="en-US" sz="2800" kern="1200"/>
+          <a:endParaRPr lang="en-US" sz="2300" kern="1200"/>
         </a:p>
       </dsp:txBody>
       <dsp:txXfrm>
-        <a:off x="32784" y="1872663"/>
-        <a:ext cx="8009226" cy="606012"/>
+        <a:off x="26930" y="1617823"/>
+        <a:ext cx="8020934" cy="497795"/>
       </dsp:txXfrm>
     </dsp:sp>
     <dsp:sp modelId="{808B7242-BF56-480B-AAC4-CEB7E754ADBE}">
@@ -2424,8 +2477,8 @@
       </dsp:nvSpPr>
       <dsp:spPr>
         <a:xfrm>
-          <a:off x="0" y="2592099"/>
-          <a:ext cx="8074794" cy="671580"/>
+          <a:off x="0" y="2208789"/>
+          <a:ext cx="8074794" cy="551655"/>
         </a:xfrm>
         <a:prstGeom prst="roundRect">
           <a:avLst/>
@@ -2467,12 +2520,12 @@
         </a:fontRef>
       </dsp:style>
       <dsp:txBody>
-        <a:bodyPr spcFirstLastPara="0" vert="horz" wrap="square" lIns="106680" tIns="106680" rIns="106680" bIns="106680" numCol="1" spcCol="1270" anchor="ctr" anchorCtr="0">
+        <a:bodyPr spcFirstLastPara="0" vert="horz" wrap="square" lIns="87630" tIns="87630" rIns="87630" bIns="87630" numCol="1" spcCol="1270" anchor="ctr" anchorCtr="0">
           <a:noAutofit/>
         </a:bodyPr>
         <a:lstStyle/>
         <a:p>
-          <a:pPr marL="0" lvl="0" indent="0" algn="l" defTabSz="1244600">
+          <a:pPr marL="0" lvl="0" indent="0" algn="l" defTabSz="1022350">
             <a:lnSpc>
               <a:spcPct val="90000"/>
             </a:lnSpc>
@@ -2485,15 +2538,15 @@
             <a:buNone/>
           </a:pPr>
           <a:r>
-            <a:rPr lang="en-GB" sz="2800" kern="1200"/>
+            <a:rPr lang="en-GB" sz="2300" kern="1200"/>
             <a:t>Formal representation of these units is important </a:t>
           </a:r>
-          <a:endParaRPr lang="en-US" sz="2800" kern="1200"/>
+          <a:endParaRPr lang="en-US" sz="2300" kern="1200"/>
         </a:p>
       </dsp:txBody>
       <dsp:txXfrm>
-        <a:off x="32784" y="2624883"/>
-        <a:ext cx="8009226" cy="606012"/>
+        <a:off x="26930" y="2235719"/>
+        <a:ext cx="8020934" cy="497795"/>
       </dsp:txXfrm>
     </dsp:sp>
     <dsp:sp modelId="{E80F8E7D-49DF-418B-B160-6F7C5CEA2B32}">
@@ -2503,8 +2556,8 @@
       </dsp:nvSpPr>
       <dsp:spPr>
         <a:xfrm>
-          <a:off x="0" y="3344319"/>
-          <a:ext cx="8074794" cy="671580"/>
+          <a:off x="0" y="2826684"/>
+          <a:ext cx="8074794" cy="551655"/>
         </a:xfrm>
         <a:prstGeom prst="roundRect">
           <a:avLst/>
@@ -2546,12 +2599,12 @@
         </a:fontRef>
       </dsp:style>
       <dsp:txBody>
-        <a:bodyPr spcFirstLastPara="0" vert="horz" wrap="square" lIns="106680" tIns="106680" rIns="106680" bIns="106680" numCol="1" spcCol="1270" anchor="ctr" anchorCtr="0">
+        <a:bodyPr spcFirstLastPara="0" vert="horz" wrap="square" lIns="87630" tIns="87630" rIns="87630" bIns="87630" numCol="1" spcCol="1270" anchor="ctr" anchorCtr="0">
           <a:noAutofit/>
         </a:bodyPr>
         <a:lstStyle/>
         <a:p>
-          <a:pPr marL="0" lvl="0" indent="0" algn="l" defTabSz="1244600">
+          <a:pPr marL="0" lvl="0" indent="0" algn="l" defTabSz="1022350">
             <a:lnSpc>
               <a:spcPct val="90000"/>
             </a:lnSpc>
@@ -2564,15 +2617,93 @@
             <a:buNone/>
           </a:pPr>
           <a:r>
-            <a:rPr lang="en-GB" sz="2800" kern="1200"/>
+            <a:rPr lang="en-GB" sz="2300" kern="1200" dirty="0"/>
             <a:t>Reduced error-prone and tedious calculations</a:t>
           </a:r>
-          <a:endParaRPr lang="en-US" sz="2800" kern="1200"/>
+          <a:endParaRPr lang="en-US" sz="2300" kern="1200" dirty="0"/>
         </a:p>
       </dsp:txBody>
       <dsp:txXfrm>
-        <a:off x="32784" y="3377103"/>
-        <a:ext cx="8009226" cy="606012"/>
+        <a:off x="26930" y="2853614"/>
+        <a:ext cx="8020934" cy="497795"/>
+      </dsp:txXfrm>
+    </dsp:sp>
+    <dsp:sp modelId="{05612A00-4CA2-894F-B3D1-CE9AA7B5D3C6}">
+      <dsp:nvSpPr>
+        <dsp:cNvPr id="0" name=""/>
+        <dsp:cNvSpPr/>
+      </dsp:nvSpPr>
+      <dsp:spPr>
+        <a:xfrm>
+          <a:off x="0" y="3444579"/>
+          <a:ext cx="8074794" cy="551655"/>
+        </a:xfrm>
+        <a:prstGeom prst="roundRect">
+          <a:avLst/>
+        </a:prstGeom>
+        <a:solidFill>
+          <a:schemeClr val="dk2">
+            <a:hueOff val="0"/>
+            <a:satOff val="0"/>
+            <a:lumOff val="0"/>
+            <a:alphaOff val="0"/>
+          </a:schemeClr>
+        </a:solidFill>
+        <a:ln w="12700" cap="flat" cmpd="sng" algn="ctr">
+          <a:solidFill>
+            <a:schemeClr val="lt2">
+              <a:hueOff val="0"/>
+              <a:satOff val="0"/>
+              <a:lumOff val="0"/>
+              <a:alphaOff val="0"/>
+            </a:schemeClr>
+          </a:solidFill>
+          <a:prstDash val="solid"/>
+          <a:miter lim="800000"/>
+        </a:ln>
+        <a:effectLst/>
+      </dsp:spPr>
+      <dsp:style>
+        <a:lnRef idx="2">
+          <a:scrgbClr r="0" g="0" b="0"/>
+        </a:lnRef>
+        <a:fillRef idx="1">
+          <a:scrgbClr r="0" g="0" b="0"/>
+        </a:fillRef>
+        <a:effectRef idx="0">
+          <a:scrgbClr r="0" g="0" b="0"/>
+        </a:effectRef>
+        <a:fontRef idx="minor">
+          <a:schemeClr val="lt1"/>
+        </a:fontRef>
+      </dsp:style>
+      <dsp:txBody>
+        <a:bodyPr spcFirstLastPara="0" vert="horz" wrap="square" lIns="87630" tIns="87630" rIns="87630" bIns="87630" numCol="1" spcCol="1270" anchor="ctr" anchorCtr="0">
+          <a:noAutofit/>
+        </a:bodyPr>
+        <a:lstStyle/>
+        <a:p>
+          <a:pPr marL="0" lvl="0" indent="0" algn="l" defTabSz="1022350">
+            <a:lnSpc>
+              <a:spcPct val="90000"/>
+            </a:lnSpc>
+            <a:spcBef>
+              <a:spcPct val="0"/>
+            </a:spcBef>
+            <a:spcAft>
+              <a:spcPct val="35000"/>
+            </a:spcAft>
+            <a:buNone/>
+          </a:pPr>
+          <a:r>
+            <a:rPr lang="en-GB" sz="2300" kern="1200" dirty="0"/>
+            <a:t>History: used for personalised medicine application conversions</a:t>
+          </a:r>
+        </a:p>
+      </dsp:txBody>
+      <dsp:txXfrm>
+        <a:off x="26930" y="3471509"/>
+        <a:ext cx="8020934" cy="497795"/>
       </dsp:txXfrm>
     </dsp:sp>
   </dsp:spTree>
@@ -5311,7 +5442,7 @@
           <a:p>
             <a:fld id="{6E38A9DC-9E25-4685-838D-AB5A97295B66}" type="datetimeFigureOut">
               <a:rPr lang="en-GB" smtClean="0"/>
-              <a:t>05/03/2023</a:t>
+              <a:t>06/03/2023</a:t>
             </a:fld>
             <a:endParaRPr lang="en-GB"/>
           </a:p>
@@ -5728,7 +5859,7 @@
           <a:p>
             <a:fld id="{76BA3A6F-BBBE-436E-BB97-5B6DF122B556}" type="datetime1">
               <a:rPr lang="en-GB" smtClean="0"/>
-              <a:t>05/03/2023</a:t>
+              <a:t>06/03/2023</a:t>
             </a:fld>
             <a:endParaRPr lang="en-GB"/>
           </a:p>
@@ -5928,7 +6059,7 @@
           <a:p>
             <a:fld id="{106653B1-8131-4A6A-AB9C-1B28906E5FEE}" type="datetime1">
               <a:rPr lang="en-GB" smtClean="0"/>
-              <a:t>05/03/2023</a:t>
+              <a:t>06/03/2023</a:t>
             </a:fld>
             <a:endParaRPr lang="en-GB"/>
           </a:p>
@@ -6138,7 +6269,7 @@
           <a:p>
             <a:fld id="{47D19019-6859-4879-8AA6-4F38C4CE2845}" type="datetime1">
               <a:rPr lang="en-GB" smtClean="0"/>
-              <a:t>05/03/2023</a:t>
+              <a:t>06/03/2023</a:t>
             </a:fld>
             <a:endParaRPr lang="en-GB"/>
           </a:p>
@@ -6338,7 +6469,7 @@
           <a:p>
             <a:fld id="{3DE72EEC-4252-4E73-8225-170A8383FE1B}" type="datetime1">
               <a:rPr lang="en-GB" smtClean="0"/>
-              <a:t>05/03/2023</a:t>
+              <a:t>06/03/2023</a:t>
             </a:fld>
             <a:endParaRPr lang="en-GB"/>
           </a:p>
@@ -6614,7 +6745,7 @@
           <a:p>
             <a:fld id="{BCF9D066-5873-442E-81C1-798E97D368C4}" type="datetime1">
               <a:rPr lang="en-GB" smtClean="0"/>
-              <a:t>05/03/2023</a:t>
+              <a:t>06/03/2023</a:t>
             </a:fld>
             <a:endParaRPr lang="en-GB"/>
           </a:p>
@@ -6882,7 +7013,7 @@
           <a:p>
             <a:fld id="{259DAECF-0D0C-4D26-8816-3E375E6DDDE1}" type="datetime1">
               <a:rPr lang="en-GB" smtClean="0"/>
-              <a:t>05/03/2023</a:t>
+              <a:t>06/03/2023</a:t>
             </a:fld>
             <a:endParaRPr lang="en-GB"/>
           </a:p>
@@ -7297,7 +7428,7 @@
           <a:p>
             <a:fld id="{7ED82D9C-D78C-456A-B535-5A7B6456CBE0}" type="datetime1">
               <a:rPr lang="en-GB" smtClean="0"/>
-              <a:t>05/03/2023</a:t>
+              <a:t>06/03/2023</a:t>
             </a:fld>
             <a:endParaRPr lang="en-GB"/>
           </a:p>
@@ -7439,7 +7570,7 @@
           <a:p>
             <a:fld id="{01C34CFD-872B-4AF2-9E66-74021F29E875}" type="datetime1">
               <a:rPr lang="en-GB" smtClean="0"/>
-              <a:t>05/03/2023</a:t>
+              <a:t>06/03/2023</a:t>
             </a:fld>
             <a:endParaRPr lang="en-GB"/>
           </a:p>
@@ -7552,7 +7683,7 @@
           <a:p>
             <a:fld id="{6FFA839B-BDF8-4769-8D67-FA57AE014E53}" type="datetime1">
               <a:rPr lang="en-GB" smtClean="0"/>
-              <a:t>05/03/2023</a:t>
+              <a:t>06/03/2023</a:t>
             </a:fld>
             <a:endParaRPr lang="en-GB"/>
           </a:p>
@@ -7865,7 +7996,7 @@
           <a:p>
             <a:fld id="{3B2B6CA8-E50F-45F8-B86F-33C95EF8D81F}" type="datetime1">
               <a:rPr lang="en-GB" smtClean="0"/>
-              <a:t>05/03/2023</a:t>
+              <a:t>06/03/2023</a:t>
             </a:fld>
             <a:endParaRPr lang="en-GB"/>
           </a:p>
@@ -8154,7 +8285,7 @@
           <a:p>
             <a:fld id="{217FF8D2-F24E-40FD-A84F-A85975E72917}" type="datetime1">
               <a:rPr lang="en-GB" smtClean="0"/>
-              <a:t>05/03/2023</a:t>
+              <a:t>06/03/2023</a:t>
             </a:fld>
             <a:endParaRPr lang="en-GB"/>
           </a:p>
@@ -8397,7 +8528,7 @@
           <a:p>
             <a:fld id="{1A2DE837-6299-448E-95CE-52ABCF7B0F1E}" type="datetime1">
               <a:rPr lang="en-GB" smtClean="0"/>
-              <a:t>05/03/2023</a:t>
+              <a:t>06/03/2023</a:t>
             </a:fld>
             <a:endParaRPr lang="en-GB"/>
           </a:p>
@@ -9200,8 +9331,8 @@
         </p:blipFill>
         <p:spPr>
           <a:xfrm>
-            <a:off x="9927701" y="39629"/>
-            <a:ext cx="2207299" cy="776564"/>
+            <a:off x="9927700" y="39629"/>
+            <a:ext cx="2210244" cy="777600"/>
           </a:xfrm>
           <a:prstGeom prst="rect">
             <a:avLst/>
@@ -9333,7 +9464,7 @@
           <a:bodyPr/>
           <a:lstStyle/>
           <a:p>
-            <a:endParaRPr lang="en-GB"/>
+            <a:endParaRPr lang="en-GB" dirty="0"/>
           </a:p>
         </p:txBody>
       </p:sp>
@@ -9467,6 +9598,16 @@
             <a:r>
               <a:rPr lang="en-GB" dirty="0"/>
               <a:t>ISQ provides some approximation function that should be taken into account for high-precision calculations</a:t>
+            </a:r>
+          </a:p>
+          <a:p>
+            <a:pPr lvl="1"/>
+            <a:endParaRPr lang="en-GB" dirty="0"/>
+          </a:p>
+          <a:p>
+            <a:r>
+              <a:rPr lang="en-GB" dirty="0"/>
+              <a:t>History: used for personalised medicine application conversions</a:t>
             </a:r>
           </a:p>
         </p:txBody>
@@ -9932,7 +10073,7 @@
             <p:ph idx="1"/>
             <p:extLst>
               <p:ext uri="{D42A27DB-BD31-4B8C-83A1-F6EECF244321}">
-                <p14:modId xmlns:p14="http://schemas.microsoft.com/office/powerpoint/2010/main" val="1266216950"/>
+                <p14:modId xmlns:p14="http://schemas.microsoft.com/office/powerpoint/2010/main" val="898778268"/>
               </p:ext>
             </p:extLst>
           </p:nvPr>
@@ -13864,7 +14005,7 @@
         </p:spPr>
         <p:txBody>
           <a:bodyPr>
-            <a:normAutofit/>
+            <a:normAutofit fontScale="92500"/>
           </a:bodyPr>
           <a:lstStyle/>
           <a:p>
@@ -13877,6 +14018,12 @@
             <a:r>
               <a:rPr lang="en-GB" sz="2000" dirty="0"/>
               <a:t>Quantity convert uses set product of integer exponents for corresponding schemas</a:t>
+            </a:r>
+          </a:p>
+          <a:p>
+            <a:r>
+              <a:rPr lang="en-GB" sz="2000" dirty="0"/>
+              <a:t>Be aware of potential real precision issues</a:t>
             </a:r>
           </a:p>
         </p:txBody>

</xml_diff>

<commit_message>
Added conference title to ISQ slides
</commit_message>
<xml_diff>
--- a/plugins/vdm2isa/pub/isq-lib/International System of Quantities library in VDM.pptx
+++ b/plugins/vdm2isa/pub/isq-lib/International System of Quantities library in VDM.pptx
@@ -5443,7 +5443,7 @@
           <a:p>
             <a:fld id="{6E38A9DC-9E25-4685-838D-AB5A97295B66}" type="datetimeFigureOut">
               <a:rPr lang="en-GB" smtClean="0"/>
-              <a:t>07/03/2023</a:t>
+              <a:t>08/03/2023</a:t>
             </a:fld>
             <a:endParaRPr lang="en-GB"/>
           </a:p>
@@ -5860,7 +5860,7 @@
           <a:p>
             <a:fld id="{76BA3A6F-BBBE-436E-BB97-5B6DF122B556}" type="datetime1">
               <a:rPr lang="en-GB" smtClean="0"/>
-              <a:t>07/03/2023</a:t>
+              <a:t>08/03/2023</a:t>
             </a:fld>
             <a:endParaRPr lang="en-GB"/>
           </a:p>
@@ -6060,7 +6060,7 @@
           <a:p>
             <a:fld id="{106653B1-8131-4A6A-AB9C-1B28906E5FEE}" type="datetime1">
               <a:rPr lang="en-GB" smtClean="0"/>
-              <a:t>07/03/2023</a:t>
+              <a:t>08/03/2023</a:t>
             </a:fld>
             <a:endParaRPr lang="en-GB"/>
           </a:p>
@@ -6270,7 +6270,7 @@
           <a:p>
             <a:fld id="{47D19019-6859-4879-8AA6-4F38C4CE2845}" type="datetime1">
               <a:rPr lang="en-GB" smtClean="0"/>
-              <a:t>07/03/2023</a:t>
+              <a:t>08/03/2023</a:t>
             </a:fld>
             <a:endParaRPr lang="en-GB"/>
           </a:p>
@@ -6470,7 +6470,7 @@
           <a:p>
             <a:fld id="{3DE72EEC-4252-4E73-8225-170A8383FE1B}" type="datetime1">
               <a:rPr lang="en-GB" smtClean="0"/>
-              <a:t>07/03/2023</a:t>
+              <a:t>08/03/2023</a:t>
             </a:fld>
             <a:endParaRPr lang="en-GB"/>
           </a:p>
@@ -6746,7 +6746,7 @@
           <a:p>
             <a:fld id="{BCF9D066-5873-442E-81C1-798E97D368C4}" type="datetime1">
               <a:rPr lang="en-GB" smtClean="0"/>
-              <a:t>07/03/2023</a:t>
+              <a:t>08/03/2023</a:t>
             </a:fld>
             <a:endParaRPr lang="en-GB"/>
           </a:p>
@@ -7014,7 +7014,7 @@
           <a:p>
             <a:fld id="{259DAECF-0D0C-4D26-8816-3E375E6DDDE1}" type="datetime1">
               <a:rPr lang="en-GB" smtClean="0"/>
-              <a:t>07/03/2023</a:t>
+              <a:t>08/03/2023</a:t>
             </a:fld>
             <a:endParaRPr lang="en-GB"/>
           </a:p>
@@ -7429,7 +7429,7 @@
           <a:p>
             <a:fld id="{7ED82D9C-D78C-456A-B535-5A7B6456CBE0}" type="datetime1">
               <a:rPr lang="en-GB" smtClean="0"/>
-              <a:t>07/03/2023</a:t>
+              <a:t>08/03/2023</a:t>
             </a:fld>
             <a:endParaRPr lang="en-GB"/>
           </a:p>
@@ -7571,7 +7571,7 @@
           <a:p>
             <a:fld id="{01C34CFD-872B-4AF2-9E66-74021F29E875}" type="datetime1">
               <a:rPr lang="en-GB" smtClean="0"/>
-              <a:t>07/03/2023</a:t>
+              <a:t>08/03/2023</a:t>
             </a:fld>
             <a:endParaRPr lang="en-GB"/>
           </a:p>
@@ -7684,7 +7684,7 @@
           <a:p>
             <a:fld id="{6FFA839B-BDF8-4769-8D67-FA57AE014E53}" type="datetime1">
               <a:rPr lang="en-GB" smtClean="0"/>
-              <a:t>07/03/2023</a:t>
+              <a:t>08/03/2023</a:t>
             </a:fld>
             <a:endParaRPr lang="en-GB"/>
           </a:p>
@@ -7997,7 +7997,7 @@
           <a:p>
             <a:fld id="{3B2B6CA8-E50F-45F8-B86F-33C95EF8D81F}" type="datetime1">
               <a:rPr lang="en-GB" smtClean="0"/>
-              <a:t>07/03/2023</a:t>
+              <a:t>08/03/2023</a:t>
             </a:fld>
             <a:endParaRPr lang="en-GB"/>
           </a:p>
@@ -8286,7 +8286,7 @@
           <a:p>
             <a:fld id="{217FF8D2-F24E-40FD-A84F-A85975E72917}" type="datetime1">
               <a:rPr lang="en-GB" smtClean="0"/>
-              <a:t>07/03/2023</a:t>
+              <a:t>08/03/2023</a:t>
             </a:fld>
             <a:endParaRPr lang="en-GB"/>
           </a:p>
@@ -8529,7 +8529,7 @@
           <a:p>
             <a:fld id="{1A2DE837-6299-448E-95CE-52ABCF7B0F1E}" type="datetime1">
               <a:rPr lang="en-GB" smtClean="0"/>
-              <a:t>07/03/2023</a:t>
+              <a:t>08/03/2023</a:t>
             </a:fld>
             <a:endParaRPr lang="en-GB"/>
           </a:p>
@@ -9133,8 +9133,8 @@
         </p:nvSpPr>
         <p:spPr>
           <a:xfrm>
-            <a:off x="638921" y="4013165"/>
-            <a:ext cx="4204012" cy="2205732"/>
+            <a:off x="638921" y="5565123"/>
+            <a:ext cx="4204012" cy="653773"/>
           </a:xfrm>
         </p:spPr>
         <p:txBody>
@@ -9145,7 +9145,7 @@
           <a:p>
             <a:pPr algn="r"/>
             <a:r>
-              <a:rPr lang="en-US" sz="1800" kern="1200">
+              <a:rPr lang="en-US" sz="1800" kern="1200" dirty="0">
                 <a:solidFill>
                   <a:srgbClr val="FFFFFF"/>
                 </a:solidFill>
@@ -9354,7 +9354,7 @@
         </p:nvSpPr>
         <p:spPr>
           <a:xfrm>
-            <a:off x="1550708" y="4334490"/>
+            <a:off x="1568875" y="5806008"/>
             <a:ext cx="3381015" cy="307777"/>
           </a:xfrm>
           <a:prstGeom prst="rect">
@@ -9382,6 +9382,225 @@
                 </a:solidFill>
               </a:rPr>
               <a:t>School of Computing, Newcastle University</a:t>
+            </a:r>
+          </a:p>
+        </p:txBody>
+      </p:sp>
+      <p:sp>
+        <p:nvSpPr>
+          <p:cNvPr id="4" name="Subtitle 2">
+            <a:extLst>
+              <a:ext uri="{FF2B5EF4-FFF2-40B4-BE49-F238E27FC236}">
+                <a16:creationId xmlns:a16="http://schemas.microsoft.com/office/drawing/2014/main" id="{5A4A5C34-7B8C-0DF8-A9AD-2D9664656794}"/>
+              </a:ext>
+            </a:extLst>
+          </p:cNvPr>
+          <p:cNvSpPr txBox="1">
+            <a:spLocks/>
+          </p:cNvSpPr>
+          <p:nvPr/>
+        </p:nvSpPr>
+        <p:spPr>
+          <a:xfrm>
+            <a:off x="514587" y="4048069"/>
+            <a:ext cx="4204012" cy="653773"/>
+          </a:xfrm>
+          <a:prstGeom prst="rect">
+            <a:avLst/>
+          </a:prstGeom>
+        </p:spPr>
+        <p:txBody>
+          <a:bodyPr vert="horz" lIns="91440" tIns="45720" rIns="91440" bIns="45720" rtlCol="0" anchor="t">
+            <a:normAutofit/>
+          </a:bodyPr>
+          <a:lstStyle>
+            <a:lvl1pPr marL="0" indent="0" algn="ctr" defTabSz="914400" rtl="0" eaLnBrk="1" latinLnBrk="0" hangingPunct="1">
+              <a:lnSpc>
+                <a:spcPct val="90000"/>
+              </a:lnSpc>
+              <a:spcBef>
+                <a:spcPts val="1000"/>
+              </a:spcBef>
+              <a:buFont typeface="Arial" panose="020B0604020202020204" pitchFamily="34" charset="0"/>
+              <a:buNone/>
+              <a:defRPr sz="2400" kern="1200">
+                <a:solidFill>
+                  <a:schemeClr val="tx1">
+                    <a:lumMod val="75000"/>
+                    <a:lumOff val="25000"/>
+                  </a:schemeClr>
+                </a:solidFill>
+                <a:latin typeface="+mn-lt"/>
+                <a:ea typeface="+mn-ea"/>
+                <a:cs typeface="+mn-cs"/>
+              </a:defRPr>
+            </a:lvl1pPr>
+            <a:lvl2pPr marL="457200" indent="0" algn="ctr" defTabSz="914400" rtl="0" eaLnBrk="1" latinLnBrk="0" hangingPunct="1">
+              <a:lnSpc>
+                <a:spcPct val="90000"/>
+              </a:lnSpc>
+              <a:spcBef>
+                <a:spcPts val="500"/>
+              </a:spcBef>
+              <a:buFont typeface="Arial" panose="020B0604020202020204" pitchFamily="34" charset="0"/>
+              <a:buNone/>
+              <a:defRPr sz="2000" kern="1200">
+                <a:solidFill>
+                  <a:schemeClr val="tx1">
+                    <a:lumMod val="75000"/>
+                    <a:lumOff val="25000"/>
+                  </a:schemeClr>
+                </a:solidFill>
+                <a:latin typeface="+mn-lt"/>
+                <a:ea typeface="+mn-ea"/>
+                <a:cs typeface="+mn-cs"/>
+              </a:defRPr>
+            </a:lvl2pPr>
+            <a:lvl3pPr marL="914400" indent="0" algn="ctr" defTabSz="914400" rtl="0" eaLnBrk="1" latinLnBrk="0" hangingPunct="1">
+              <a:lnSpc>
+                <a:spcPct val="90000"/>
+              </a:lnSpc>
+              <a:spcBef>
+                <a:spcPts val="500"/>
+              </a:spcBef>
+              <a:buFont typeface="Arial" panose="020B0604020202020204" pitchFamily="34" charset="0"/>
+              <a:buNone/>
+              <a:defRPr sz="1800" kern="1200">
+                <a:solidFill>
+                  <a:schemeClr val="tx1">
+                    <a:lumMod val="75000"/>
+                    <a:lumOff val="25000"/>
+                  </a:schemeClr>
+                </a:solidFill>
+                <a:latin typeface="+mn-lt"/>
+                <a:ea typeface="+mn-ea"/>
+                <a:cs typeface="+mn-cs"/>
+              </a:defRPr>
+            </a:lvl3pPr>
+            <a:lvl4pPr marL="1371600" indent="0" algn="ctr" defTabSz="914400" rtl="0" eaLnBrk="1" latinLnBrk="0" hangingPunct="1">
+              <a:lnSpc>
+                <a:spcPct val="90000"/>
+              </a:lnSpc>
+              <a:spcBef>
+                <a:spcPts val="500"/>
+              </a:spcBef>
+              <a:buFont typeface="Arial" panose="020B0604020202020204" pitchFamily="34" charset="0"/>
+              <a:buNone/>
+              <a:defRPr sz="1600" kern="1200">
+                <a:solidFill>
+                  <a:schemeClr val="tx1">
+                    <a:lumMod val="75000"/>
+                    <a:lumOff val="25000"/>
+                  </a:schemeClr>
+                </a:solidFill>
+                <a:latin typeface="+mn-lt"/>
+                <a:ea typeface="+mn-ea"/>
+                <a:cs typeface="+mn-cs"/>
+              </a:defRPr>
+            </a:lvl4pPr>
+            <a:lvl5pPr marL="1828800" indent="0" algn="ctr" defTabSz="914400" rtl="0" eaLnBrk="1" latinLnBrk="0" hangingPunct="1">
+              <a:lnSpc>
+                <a:spcPct val="90000"/>
+              </a:lnSpc>
+              <a:spcBef>
+                <a:spcPts val="500"/>
+              </a:spcBef>
+              <a:buFont typeface="Arial" panose="020B0604020202020204" pitchFamily="34" charset="0"/>
+              <a:buNone/>
+              <a:defRPr sz="1600" kern="1200">
+                <a:solidFill>
+                  <a:schemeClr val="tx1">
+                    <a:lumMod val="75000"/>
+                    <a:lumOff val="25000"/>
+                  </a:schemeClr>
+                </a:solidFill>
+                <a:latin typeface="+mn-lt"/>
+                <a:ea typeface="+mn-ea"/>
+                <a:cs typeface="+mn-cs"/>
+              </a:defRPr>
+            </a:lvl5pPr>
+            <a:lvl6pPr marL="2286000" indent="0" algn="ctr" defTabSz="914400" rtl="0" eaLnBrk="1" latinLnBrk="0" hangingPunct="1">
+              <a:lnSpc>
+                <a:spcPct val="90000"/>
+              </a:lnSpc>
+              <a:spcBef>
+                <a:spcPts val="500"/>
+              </a:spcBef>
+              <a:buFont typeface="Arial" panose="020B0604020202020204" pitchFamily="34" charset="0"/>
+              <a:buNone/>
+              <a:defRPr sz="1600" kern="1200">
+                <a:solidFill>
+                  <a:schemeClr val="tx1"/>
+                </a:solidFill>
+                <a:latin typeface="+mn-lt"/>
+                <a:ea typeface="+mn-ea"/>
+                <a:cs typeface="+mn-cs"/>
+              </a:defRPr>
+            </a:lvl6pPr>
+            <a:lvl7pPr marL="2743200" indent="0" algn="ctr" defTabSz="914400" rtl="0" eaLnBrk="1" latinLnBrk="0" hangingPunct="1">
+              <a:lnSpc>
+                <a:spcPct val="90000"/>
+              </a:lnSpc>
+              <a:spcBef>
+                <a:spcPts val="500"/>
+              </a:spcBef>
+              <a:buFont typeface="Arial" panose="020B0604020202020204" pitchFamily="34" charset="0"/>
+              <a:buNone/>
+              <a:defRPr sz="1600" kern="1200">
+                <a:solidFill>
+                  <a:schemeClr val="tx1"/>
+                </a:solidFill>
+                <a:latin typeface="+mn-lt"/>
+                <a:ea typeface="+mn-ea"/>
+                <a:cs typeface="+mn-cs"/>
+              </a:defRPr>
+            </a:lvl7pPr>
+            <a:lvl8pPr marL="3200400" indent="0" algn="ctr" defTabSz="914400" rtl="0" eaLnBrk="1" latinLnBrk="0" hangingPunct="1">
+              <a:lnSpc>
+                <a:spcPct val="90000"/>
+              </a:lnSpc>
+              <a:spcBef>
+                <a:spcPts val="500"/>
+              </a:spcBef>
+              <a:buFont typeface="Arial" panose="020B0604020202020204" pitchFamily="34" charset="0"/>
+              <a:buNone/>
+              <a:defRPr sz="1600" kern="1200">
+                <a:solidFill>
+                  <a:schemeClr val="tx1"/>
+                </a:solidFill>
+                <a:latin typeface="+mn-lt"/>
+                <a:ea typeface="+mn-ea"/>
+                <a:cs typeface="+mn-cs"/>
+              </a:defRPr>
+            </a:lvl8pPr>
+            <a:lvl9pPr marL="3657600" indent="0" algn="ctr" defTabSz="914400" rtl="0" eaLnBrk="1" latinLnBrk="0" hangingPunct="1">
+              <a:lnSpc>
+                <a:spcPct val="90000"/>
+              </a:lnSpc>
+              <a:spcBef>
+                <a:spcPts val="500"/>
+              </a:spcBef>
+              <a:buFont typeface="Arial" panose="020B0604020202020204" pitchFamily="34" charset="0"/>
+              <a:buNone/>
+              <a:defRPr sz="1600" kern="1200">
+                <a:solidFill>
+                  <a:schemeClr val="tx1"/>
+                </a:solidFill>
+                <a:latin typeface="+mn-lt"/>
+                <a:ea typeface="+mn-ea"/>
+                <a:cs typeface="+mn-cs"/>
+              </a:defRPr>
+            </a:lvl9pPr>
+          </a:lstStyle>
+          <a:p>
+            <a:pPr algn="r"/>
+            <a:r>
+              <a:rPr lang="en-US" sz="1800" dirty="0">
+                <a:solidFill>
+                  <a:srgbClr val="FFFFFF"/>
+                </a:solidFill>
+              </a:rPr>
+              <a:t>Overture Workshop 2023 </a:t>
             </a:r>
           </a:p>
         </p:txBody>

</xml_diff>